<commit_message>
updated js file and presentation
</commit_message>
<xml_diff>
--- a/Presentation/MoviePick.pptx
+++ b/Presentation/MoviePick.pptx
@@ -273,7 +273,7 @@
           <a:p>
             <a:fld id="{876D88D8-D857-4E94-9881-DCD8DDF136FC}" type="datetimeFigureOut">
               <a:rPr lang="en-AU" smtClean="0"/>
-              <a:t>26/08/2022</a:t>
+              <a:t>27/08/2022</a:t>
             </a:fld>
             <a:endParaRPr lang="en-AU"/>
           </a:p>
@@ -473,7 +473,7 @@
           <a:p>
             <a:fld id="{876D88D8-D857-4E94-9881-DCD8DDF136FC}" type="datetimeFigureOut">
               <a:rPr lang="en-AU" smtClean="0"/>
-              <a:t>26/08/2022</a:t>
+              <a:t>27/08/2022</a:t>
             </a:fld>
             <a:endParaRPr lang="en-AU"/>
           </a:p>
@@ -683,7 +683,7 @@
           <a:p>
             <a:fld id="{876D88D8-D857-4E94-9881-DCD8DDF136FC}" type="datetimeFigureOut">
               <a:rPr lang="en-AU" smtClean="0"/>
-              <a:t>26/08/2022</a:t>
+              <a:t>27/08/2022</a:t>
             </a:fld>
             <a:endParaRPr lang="en-AU"/>
           </a:p>
@@ -883,7 +883,7 @@
           <a:p>
             <a:fld id="{876D88D8-D857-4E94-9881-DCD8DDF136FC}" type="datetimeFigureOut">
               <a:rPr lang="en-AU" smtClean="0"/>
-              <a:t>26/08/2022</a:t>
+              <a:t>27/08/2022</a:t>
             </a:fld>
             <a:endParaRPr lang="en-AU"/>
           </a:p>
@@ -1159,7 +1159,7 @@
           <a:p>
             <a:fld id="{876D88D8-D857-4E94-9881-DCD8DDF136FC}" type="datetimeFigureOut">
               <a:rPr lang="en-AU" smtClean="0"/>
-              <a:t>26/08/2022</a:t>
+              <a:t>27/08/2022</a:t>
             </a:fld>
             <a:endParaRPr lang="en-AU"/>
           </a:p>
@@ -1427,7 +1427,7 @@
           <a:p>
             <a:fld id="{876D88D8-D857-4E94-9881-DCD8DDF136FC}" type="datetimeFigureOut">
               <a:rPr lang="en-AU" smtClean="0"/>
-              <a:t>26/08/2022</a:t>
+              <a:t>27/08/2022</a:t>
             </a:fld>
             <a:endParaRPr lang="en-AU"/>
           </a:p>
@@ -1842,7 +1842,7 @@
           <a:p>
             <a:fld id="{876D88D8-D857-4E94-9881-DCD8DDF136FC}" type="datetimeFigureOut">
               <a:rPr lang="en-AU" smtClean="0"/>
-              <a:t>26/08/2022</a:t>
+              <a:t>27/08/2022</a:t>
             </a:fld>
             <a:endParaRPr lang="en-AU"/>
           </a:p>
@@ -1984,7 +1984,7 @@
           <a:p>
             <a:fld id="{876D88D8-D857-4E94-9881-DCD8DDF136FC}" type="datetimeFigureOut">
               <a:rPr lang="en-AU" smtClean="0"/>
-              <a:t>26/08/2022</a:t>
+              <a:t>27/08/2022</a:t>
             </a:fld>
             <a:endParaRPr lang="en-AU"/>
           </a:p>
@@ -2097,7 +2097,7 @@
           <a:p>
             <a:fld id="{876D88D8-D857-4E94-9881-DCD8DDF136FC}" type="datetimeFigureOut">
               <a:rPr lang="en-AU" smtClean="0"/>
-              <a:t>26/08/2022</a:t>
+              <a:t>27/08/2022</a:t>
             </a:fld>
             <a:endParaRPr lang="en-AU"/>
           </a:p>
@@ -2410,7 +2410,7 @@
           <a:p>
             <a:fld id="{876D88D8-D857-4E94-9881-DCD8DDF136FC}" type="datetimeFigureOut">
               <a:rPr lang="en-AU" smtClean="0"/>
-              <a:t>26/08/2022</a:t>
+              <a:t>27/08/2022</a:t>
             </a:fld>
             <a:endParaRPr lang="en-AU"/>
           </a:p>
@@ -2699,7 +2699,7 @@
           <a:p>
             <a:fld id="{876D88D8-D857-4E94-9881-DCD8DDF136FC}" type="datetimeFigureOut">
               <a:rPr lang="en-AU" smtClean="0"/>
-              <a:t>26/08/2022</a:t>
+              <a:t>27/08/2022</a:t>
             </a:fld>
             <a:endParaRPr lang="en-AU"/>
           </a:p>
@@ -2942,7 +2942,7 @@
           <a:p>
             <a:fld id="{876D88D8-D857-4E94-9881-DCD8DDF136FC}" type="datetimeFigureOut">
               <a:rPr lang="en-AU" smtClean="0"/>
-              <a:t>26/08/2022</a:t>
+              <a:t>27/08/2022</a:t>
             </a:fld>
             <a:endParaRPr lang="en-AU"/>
           </a:p>
@@ -3426,7 +3426,7 @@
             <a:avLst/>
           </a:prstGeom>
           <a:solidFill>
-            <a:srgbClr val="C00000"/>
+            <a:srgbClr val="A0353A"/>
           </a:solidFill>
           <a:ln>
             <a:solidFill>
@@ -3646,7 +3646,7 @@
             <a:avLst/>
           </a:prstGeom>
           <a:solidFill>
-            <a:srgbClr val="C00000"/>
+            <a:srgbClr val="A0353A"/>
           </a:solidFill>
           <a:ln>
             <a:solidFill>
@@ -3965,7 +3965,7 @@
             <a:avLst/>
           </a:prstGeom>
           <a:solidFill>
-            <a:srgbClr val="C00000"/>
+            <a:srgbClr val="A0353A"/>
           </a:solidFill>
           <a:ln>
             <a:solidFill>
@@ -4185,7 +4185,7 @@
             <a:avLst/>
           </a:prstGeom>
           <a:solidFill>
-            <a:srgbClr val="C00000"/>
+            <a:srgbClr val="A0353A"/>
           </a:solidFill>
           <a:ln>
             <a:solidFill>
@@ -4372,7 +4372,7 @@
           <a:p>
             <a:r>
               <a:rPr lang="en-AU" sz="1400" b="1" dirty="0"/>
-              <a:t>The model we’ve build using the naïve bayes machine learning model to predict a users mood by comparing the users mood with movie overviews has a very low accuracy. This is due to the quality of the survey data which is to small and not extensive enough to provide data for the model achieve a better accuracy.</a:t>
+              <a:t>The model we’ve built using the naïve bayes machine learning model to predict a users mood by comparing the users mood with movie overviews has a very low accuracy. This is due to the quality of the survey data which is too small and not extensive enough to provide data for the model to achieve a better accuracy.</a:t>
             </a:r>
           </a:p>
           <a:p>
@@ -4536,7 +4536,7 @@
             <a:avLst/>
           </a:prstGeom>
           <a:solidFill>
-            <a:srgbClr val="C00000"/>
+            <a:srgbClr val="A0353A"/>
           </a:solidFill>
           <a:ln>
             <a:solidFill>
@@ -4756,7 +4756,7 @@
             <a:avLst/>
           </a:prstGeom>
           <a:solidFill>
-            <a:srgbClr val="C00000"/>
+            <a:srgbClr val="A0353A"/>
           </a:solidFill>
           <a:ln>
             <a:solidFill>
@@ -5075,7 +5075,7 @@
             <a:avLst/>
           </a:prstGeom>
           <a:solidFill>
-            <a:srgbClr val="C00000"/>
+            <a:srgbClr val="A0353A"/>
           </a:solidFill>
           <a:ln>
             <a:solidFill>
@@ -5295,7 +5295,7 @@
             <a:avLst/>
           </a:prstGeom>
           <a:solidFill>
-            <a:srgbClr val="C00000"/>
+            <a:srgbClr val="A0353A"/>
           </a:solidFill>
           <a:ln>
             <a:solidFill>
@@ -6556,7 +6556,7 @@
             <a:avLst/>
           </a:prstGeom>
           <a:solidFill>
-            <a:srgbClr val="C00000"/>
+            <a:srgbClr val="A0353A"/>
           </a:solidFill>
           <a:ln>
             <a:solidFill>
@@ -6776,7 +6776,7 @@
             <a:avLst/>
           </a:prstGeom>
           <a:solidFill>
-            <a:srgbClr val="C00000"/>
+            <a:srgbClr val="A0353A"/>
           </a:solidFill>
           <a:ln>
             <a:solidFill>
@@ -7606,7 +7606,7 @@
         </p:nvGrpSpPr>
         <p:grpSpPr>
           <a:xfrm>
-            <a:off x="5519486" y="3472070"/>
+            <a:off x="5519486" y="3465213"/>
             <a:ext cx="1997521" cy="2099386"/>
             <a:chOff x="8126911" y="2512981"/>
             <a:chExt cx="1997521" cy="2099386"/>
@@ -7886,7 +7886,7 @@
             <a:avLst/>
           </a:prstGeom>
           <a:solidFill>
-            <a:srgbClr val="C00000"/>
+            <a:srgbClr val="A0353A"/>
           </a:solidFill>
           <a:ln>
             <a:solidFill>
@@ -8106,7 +8106,7 @@
             <a:avLst/>
           </a:prstGeom>
           <a:solidFill>
-            <a:srgbClr val="C00000"/>
+            <a:srgbClr val="A0353A"/>
           </a:solidFill>
           <a:ln>
             <a:solidFill>
@@ -8474,7 +8474,7 @@
             <a:avLst/>
           </a:prstGeom>
           <a:solidFill>
-            <a:srgbClr val="C00000"/>
+            <a:srgbClr val="A0353A"/>
           </a:solidFill>
           <a:ln>
             <a:solidFill>
@@ -8694,7 +8694,7 @@
             <a:avLst/>
           </a:prstGeom>
           <a:solidFill>
-            <a:srgbClr val="C00000"/>
+            <a:srgbClr val="A0353A"/>
           </a:solidFill>
           <a:ln>
             <a:solidFill>
@@ -9034,7 +9034,7 @@
             <a:avLst/>
           </a:prstGeom>
           <a:solidFill>
-            <a:srgbClr val="C00000"/>
+            <a:srgbClr val="A0353A"/>
           </a:solidFill>
           <a:ln>
             <a:solidFill>
@@ -9254,7 +9254,7 @@
             <a:avLst/>
           </a:prstGeom>
           <a:solidFill>
-            <a:srgbClr val="C00000"/>
+            <a:srgbClr val="A0353A"/>
           </a:solidFill>
           <a:ln>
             <a:solidFill>
@@ -9700,7 +9700,7 @@
             <a:avLst/>
           </a:prstGeom>
           <a:solidFill>
-            <a:srgbClr val="C00000"/>
+            <a:srgbClr val="A0353A"/>
           </a:solidFill>
           <a:ln>
             <a:solidFill>
@@ -9920,7 +9920,7 @@
             <a:avLst/>
           </a:prstGeom>
           <a:solidFill>
-            <a:srgbClr val="C00000"/>
+            <a:srgbClr val="A0353A"/>
           </a:solidFill>
           <a:ln>
             <a:solidFill>
@@ -10905,7 +10905,7 @@
             <a:avLst/>
           </a:prstGeom>
           <a:solidFill>
-            <a:srgbClr val="C00000"/>
+            <a:srgbClr val="A0353A"/>
           </a:solidFill>
           <a:ln>
             <a:solidFill>
@@ -11125,7 +11125,7 @@
             <a:avLst/>
           </a:prstGeom>
           <a:solidFill>
-            <a:srgbClr val="C00000"/>
+            <a:srgbClr val="A0353A"/>
           </a:solidFill>
           <a:ln>
             <a:solidFill>
@@ -11912,7 +11912,7 @@
             <a:avLst/>
           </a:prstGeom>
           <a:solidFill>
-            <a:srgbClr val="C00000"/>
+            <a:srgbClr val="A0353A"/>
           </a:solidFill>
           <a:ln>
             <a:solidFill>
@@ -12132,7 +12132,7 @@
             <a:avLst/>
           </a:prstGeom>
           <a:solidFill>
-            <a:srgbClr val="C00000"/>
+            <a:srgbClr val="A0353A"/>
           </a:solidFill>
           <a:ln>
             <a:solidFill>
@@ -12822,7 +12822,7 @@
             <a:avLst/>
           </a:prstGeom>
           <a:solidFill>
-            <a:srgbClr val="C00000"/>
+            <a:srgbClr val="A0353A"/>
           </a:solidFill>
           <a:ln>
             <a:solidFill>
@@ -13042,7 +13042,7 @@
             <a:avLst/>
           </a:prstGeom>
           <a:solidFill>
-            <a:srgbClr val="C00000"/>
+            <a:srgbClr val="A0353A"/>
           </a:solidFill>
           <a:ln>
             <a:solidFill>
@@ -13553,7 +13553,7 @@
             <a:avLst/>
           </a:prstGeom>
           <a:solidFill>
-            <a:srgbClr val="C00000"/>
+            <a:srgbClr val="A0353A"/>
           </a:solidFill>
           <a:ln>
             <a:solidFill>
@@ -13773,7 +13773,7 @@
             <a:avLst/>
           </a:prstGeom>
           <a:solidFill>
-            <a:srgbClr val="C00000"/>
+            <a:srgbClr val="A0353A"/>
           </a:solidFill>
           <a:ln>
             <a:solidFill>

</xml_diff>